<commit_message>
Added background to webpage. 1. Made changes to "sign-out" & "welcome" message elements. 2. Updated ppt of the project.
</commit_message>
<xml_diff>
--- a/Documents/Expenditure tracking.pptx
+++ b/Documents/Expenditure tracking.pptx
@@ -5,7 +5,7 @@
     <p:sldMasterId id="2147483649" r:id="rId1"/>
   </p:sldMasterIdLst>
   <p:notesMasterIdLst>
-    <p:notesMasterId r:id="rId14"/>
+    <p:notesMasterId r:id="rId16"/>
   </p:notesMasterIdLst>
   <p:sldIdLst>
     <p:sldId id="256" r:id="rId2"/>
@@ -19,38 +19,33 @@
     <p:sldId id="266" r:id="rId10"/>
     <p:sldId id="275" r:id="rId11"/>
     <p:sldId id="276" r:id="rId12"/>
-    <p:sldId id="273" r:id="rId13"/>
+    <p:sldId id="278" r:id="rId13"/>
+    <p:sldId id="279" r:id="rId14"/>
+    <p:sldId id="273" r:id="rId15"/>
   </p:sldIdLst>
   <p:sldSz cx="9144000" cy="6858000" type="screen4x3"/>
   <p:notesSz cx="6858000" cy="9144000"/>
   <p:embeddedFontLst>
     <p:embeddedFont>
-      <p:font typeface="Calibri" panose="020F0502020204030204" pitchFamily="34" charset="0"/>
-      <p:regular r:id="rId15"/>
-      <p:bold r:id="rId16"/>
-      <p:italic r:id="rId17"/>
-      <p:boldItalic r:id="rId18"/>
-    </p:embeddedFont>
-    <p:embeddedFont>
       <p:font typeface="Cambria" panose="02040503050406030204" pitchFamily="18" charset="0"/>
-      <p:regular r:id="rId19"/>
-      <p:bold r:id="rId20"/>
-      <p:italic r:id="rId21"/>
-      <p:boldItalic r:id="rId22"/>
+      <p:regular r:id="rId17"/>
+      <p:bold r:id="rId18"/>
+      <p:italic r:id="rId19"/>
+      <p:boldItalic r:id="rId20"/>
     </p:embeddedFont>
     <p:embeddedFont>
       <p:font typeface="Lucida Sans" panose="020B0602030504020204" pitchFamily="34" charset="0"/>
-      <p:regular r:id="rId23"/>
-      <p:bold r:id="rId24"/>
-      <p:italic r:id="rId25"/>
-      <p:boldItalic r:id="rId26"/>
+      <p:regular r:id="rId21"/>
+      <p:bold r:id="rId22"/>
+      <p:italic r:id="rId23"/>
+      <p:boldItalic r:id="rId24"/>
     </p:embeddedFont>
     <p:embeddedFont>
       <p:font typeface="Open Sans" panose="020B0606030504020204" pitchFamily="34" charset="0"/>
-      <p:regular r:id="rId27"/>
-      <p:bold r:id="rId28"/>
-      <p:italic r:id="rId29"/>
-      <p:boldItalic r:id="rId30"/>
+      <p:regular r:id="rId25"/>
+      <p:bold r:id="rId26"/>
+      <p:italic r:id="rId27"/>
+      <p:boldItalic r:id="rId28"/>
     </p:embeddedFont>
   </p:embeddedFontLst>
   <p:defaultTextStyle>
@@ -4914,7 +4909,7 @@
                 <a:cs typeface="Times New Roman"/>
                 <a:sym typeface="Times New Roman"/>
               </a:rPr>
-              <a:t>Nirupama </a:t>
+              <a:t>Nirupama. B. K</a:t>
             </a:r>
           </a:p>
           <a:p>
@@ -5039,7 +5034,7 @@
                 <a:cs typeface="Times New Roman"/>
                 <a:sym typeface="Times New Roman"/>
               </a:rPr>
-              <a:t>Title: Expenditure tracking</a:t>
+              <a:t>Title: E-Ledger tracking for Students</a:t>
             </a:r>
             <a:endParaRPr sz="3600" dirty="0">
               <a:solidFill>
@@ -7563,6 +7558,245 @@
           <p:cNvPr id="2" name="Slide Number Placeholder 1">
             <a:extLst>
               <a:ext uri="{FF2B5EF4-FFF2-40B4-BE49-F238E27FC236}">
+                <a16:creationId xmlns:a16="http://schemas.microsoft.com/office/drawing/2014/main" id="{66E88FAC-86D8-D453-2C96-2B0681EBDAE7}"/>
+              </a:ext>
+            </a:extLst>
+          </p:cNvPr>
+          <p:cNvSpPr>
+            <a:spLocks noGrp="1"/>
+          </p:cNvSpPr>
+          <p:nvPr>
+            <p:ph type="sldNum" idx="12"/>
+          </p:nvPr>
+        </p:nvSpPr>
+        <p:spPr/>
+        <p:txBody>
+          <a:bodyPr/>
+          <a:lstStyle/>
+          <a:p>
+            <a:pPr marL="0" lvl="0" indent="0" algn="r" rtl="0">
+              <a:spcBef>
+                <a:spcPts val="0"/>
+              </a:spcBef>
+              <a:spcAft>
+                <a:spcPts val="0"/>
+              </a:spcAft>
+              <a:buNone/>
+            </a:pPr>
+            <a:fld id="{00000000-1234-1234-1234-123412341234}" type="slidenum">
+              <a:rPr lang="en-IN" smtClean="0"/>
+              <a:t>12</a:t>
+            </a:fld>
+            <a:endParaRPr lang="en-IN"/>
+          </a:p>
+        </p:txBody>
+      </p:sp>
+      <p:sp>
+        <p:nvSpPr>
+          <p:cNvPr id="4" name="TextBox 3">
+            <a:extLst>
+              <a:ext uri="{FF2B5EF4-FFF2-40B4-BE49-F238E27FC236}">
+                <a16:creationId xmlns:a16="http://schemas.microsoft.com/office/drawing/2014/main" id="{95E2561E-A76E-3CD1-3D93-3F8D0637C92A}"/>
+              </a:ext>
+            </a:extLst>
+          </p:cNvPr>
+          <p:cNvSpPr txBox="1"/>
+          <p:nvPr/>
+        </p:nvSpPr>
+        <p:spPr>
+          <a:xfrm>
+            <a:off x="2565918" y="894899"/>
+            <a:ext cx="4320074" cy="430887"/>
+          </a:xfrm>
+          <a:prstGeom prst="rect">
+            <a:avLst/>
+          </a:prstGeom>
+          <a:noFill/>
+        </p:spPr>
+        <p:txBody>
+          <a:bodyPr wrap="square" rtlCol="0">
+            <a:spAutoFit/>
+          </a:bodyPr>
+          <a:lstStyle/>
+          <a:p>
+            <a:pPr algn="ctr"/>
+            <a:r>
+              <a:rPr lang="en-US" sz="2200" dirty="0">
+                <a:latin typeface="Times New Roman" panose="02020603050405020304" pitchFamily="18" charset="0"/>
+                <a:cs typeface="Times New Roman" panose="02020603050405020304" pitchFamily="18" charset="0"/>
+              </a:rPr>
+              <a:t>Sample Outputs</a:t>
+            </a:r>
+            <a:endParaRPr lang="en-IN" sz="2200" dirty="0">
+              <a:latin typeface="Times New Roman" panose="02020603050405020304" pitchFamily="18" charset="0"/>
+              <a:cs typeface="Times New Roman" panose="02020603050405020304" pitchFamily="18" charset="0"/>
+            </a:endParaRPr>
+          </a:p>
+        </p:txBody>
+      </p:sp>
+      <p:pic>
+        <p:nvPicPr>
+          <p:cNvPr id="8" name="Picture 7">
+            <a:extLst>
+              <a:ext uri="{FF2B5EF4-FFF2-40B4-BE49-F238E27FC236}">
+                <a16:creationId xmlns:a16="http://schemas.microsoft.com/office/drawing/2014/main" id="{59BA6F4B-AE5D-A047-B928-0D5B2993D5A7}"/>
+              </a:ext>
+            </a:extLst>
+          </p:cNvPr>
+          <p:cNvPicPr>
+            <a:picLocks noChangeAspect="1"/>
+          </p:cNvPicPr>
+          <p:nvPr/>
+        </p:nvPicPr>
+        <p:blipFill>
+          <a:blip r:embed="rId2"/>
+          <a:stretch>
+            <a:fillRect/>
+          </a:stretch>
+        </p:blipFill>
+        <p:spPr>
+          <a:xfrm>
+            <a:off x="0" y="1531096"/>
+            <a:ext cx="9144000" cy="4300537"/>
+          </a:xfrm>
+          <a:prstGeom prst="rect">
+            <a:avLst/>
+          </a:prstGeom>
+        </p:spPr>
+      </p:pic>
+    </p:spTree>
+    <p:extLst>
+      <p:ext uri="{BB962C8B-B14F-4D97-AF65-F5344CB8AC3E}">
+        <p14:creationId xmlns:p14="http://schemas.microsoft.com/office/powerpoint/2010/main" val="820990305"/>
+      </p:ext>
+    </p:extLst>
+  </p:cSld>
+  <p:clrMapOvr>
+    <a:masterClrMapping/>
+  </p:clrMapOvr>
+</p:sld>
+</file>
+
+<file path=ppt/slides/slide13.xml><?xml version="1.0" encoding="utf-8"?>
+<p:sld xmlns:a="http://schemas.openxmlformats.org/drawingml/2006/main" xmlns:r="http://schemas.openxmlformats.org/officeDocument/2006/relationships" xmlns:p="http://schemas.openxmlformats.org/presentationml/2006/main">
+  <p:cSld>
+    <p:spTree>
+      <p:nvGrpSpPr>
+        <p:cNvPr id="1" name=""/>
+        <p:cNvGrpSpPr/>
+        <p:nvPr/>
+      </p:nvGrpSpPr>
+      <p:grpSpPr>
+        <a:xfrm>
+          <a:off x="0" y="0"/>
+          <a:ext cx="0" cy="0"/>
+          <a:chOff x="0" y="0"/>
+          <a:chExt cx="0" cy="0"/>
+        </a:xfrm>
+      </p:grpSpPr>
+      <p:sp>
+        <p:nvSpPr>
+          <p:cNvPr id="2" name="Slide Number Placeholder 1">
+            <a:extLst>
+              <a:ext uri="{FF2B5EF4-FFF2-40B4-BE49-F238E27FC236}">
+                <a16:creationId xmlns:a16="http://schemas.microsoft.com/office/drawing/2014/main" id="{5C7BC54F-C3E1-2E23-5411-40C9C75059B8}"/>
+              </a:ext>
+            </a:extLst>
+          </p:cNvPr>
+          <p:cNvSpPr>
+            <a:spLocks noGrp="1"/>
+          </p:cNvSpPr>
+          <p:nvPr>
+            <p:ph type="sldNum" idx="12"/>
+          </p:nvPr>
+        </p:nvSpPr>
+        <p:spPr/>
+        <p:txBody>
+          <a:bodyPr/>
+          <a:lstStyle/>
+          <a:p>
+            <a:pPr marL="0" lvl="0" indent="0" algn="r" rtl="0">
+              <a:spcBef>
+                <a:spcPts val="0"/>
+              </a:spcBef>
+              <a:spcAft>
+                <a:spcPts val="0"/>
+              </a:spcAft>
+              <a:buNone/>
+            </a:pPr>
+            <a:fld id="{00000000-1234-1234-1234-123412341234}" type="slidenum">
+              <a:rPr lang="en-IN" smtClean="0"/>
+              <a:t>13</a:t>
+            </a:fld>
+            <a:endParaRPr lang="en-IN"/>
+          </a:p>
+        </p:txBody>
+      </p:sp>
+      <p:pic>
+        <p:nvPicPr>
+          <p:cNvPr id="4" name="Picture 3">
+            <a:extLst>
+              <a:ext uri="{FF2B5EF4-FFF2-40B4-BE49-F238E27FC236}">
+                <a16:creationId xmlns:a16="http://schemas.microsoft.com/office/drawing/2014/main" id="{DF7DA8D4-CA0B-1BF2-F485-2D4B2512DCD7}"/>
+              </a:ext>
+            </a:extLst>
+          </p:cNvPr>
+          <p:cNvPicPr>
+            <a:picLocks noChangeAspect="1"/>
+          </p:cNvPicPr>
+          <p:nvPr/>
+        </p:nvPicPr>
+        <p:blipFill>
+          <a:blip r:embed="rId2"/>
+          <a:stretch>
+            <a:fillRect/>
+          </a:stretch>
+        </p:blipFill>
+        <p:spPr>
+          <a:xfrm>
+            <a:off x="0" y="1523513"/>
+            <a:ext cx="9144000" cy="4314825"/>
+          </a:xfrm>
+          <a:prstGeom prst="rect">
+            <a:avLst/>
+          </a:prstGeom>
+        </p:spPr>
+      </p:pic>
+    </p:spTree>
+    <p:extLst>
+      <p:ext uri="{BB962C8B-B14F-4D97-AF65-F5344CB8AC3E}">
+        <p14:creationId xmlns:p14="http://schemas.microsoft.com/office/powerpoint/2010/main" val="4266097063"/>
+      </p:ext>
+    </p:extLst>
+  </p:cSld>
+  <p:clrMapOvr>
+    <a:masterClrMapping/>
+  </p:clrMapOvr>
+</p:sld>
+</file>
+
+<file path=ppt/slides/slide14.xml><?xml version="1.0" encoding="utf-8"?>
+<p:sld xmlns:a="http://schemas.openxmlformats.org/drawingml/2006/main" xmlns:r="http://schemas.openxmlformats.org/officeDocument/2006/relationships" xmlns:p="http://schemas.openxmlformats.org/presentationml/2006/main">
+  <p:cSld>
+    <p:spTree>
+      <p:nvGrpSpPr>
+        <p:cNvPr id="1" name=""/>
+        <p:cNvGrpSpPr/>
+        <p:nvPr/>
+      </p:nvGrpSpPr>
+      <p:grpSpPr>
+        <a:xfrm>
+          <a:off x="0" y="0"/>
+          <a:ext cx="0" cy="0"/>
+          <a:chOff x="0" y="0"/>
+          <a:chExt cx="0" cy="0"/>
+        </a:xfrm>
+      </p:grpSpPr>
+      <p:sp>
+        <p:nvSpPr>
+          <p:cNvPr id="2" name="Slide Number Placeholder 1">
+            <a:extLst>
+              <a:ext uri="{FF2B5EF4-FFF2-40B4-BE49-F238E27FC236}">
                 <a16:creationId xmlns:a16="http://schemas.microsoft.com/office/drawing/2014/main" id="{7FEF94F2-D972-A6DD-B488-D44675CA1CDB}"/>
               </a:ext>
             </a:extLst>
@@ -7590,7 +7824,7 @@
             </a:pPr>
             <a:fld id="{00000000-1234-1234-1234-123412341234}" type="slidenum">
               <a:rPr lang="en-IN" smtClean="0"/>
-              <a:t>12</a:t>
+              <a:t>14</a:t>
             </a:fld>
             <a:endParaRPr lang="en-IN"/>
           </a:p>
@@ -11654,7 +11888,7 @@
         </p:nvSpPr>
         <p:spPr>
           <a:xfrm>
-            <a:off x="325287" y="2311715"/>
+            <a:off x="297295" y="1929160"/>
             <a:ext cx="9060110" cy="3395801"/>
           </a:xfrm>
           <a:prstGeom prst="rect">

</xml_diff>